<commit_message>
fixed anterior op note order for interbodies
</commit_message>
<xml_diff>
--- a/op_note_function_diagram.pptx
+++ b/op_note_function_diagram.pptx
@@ -6,6 +6,7 @@
   </p:sldMasterIdLst>
   <p:sldIdLst>
     <p:sldId id="256" r:id="rId2"/>
+    <p:sldId id="258" r:id="rId3"/>
   </p:sldIdLst>
   <p:sldSz cx="13716000" cy="6858000"/>
   <p:notesSz cx="6858000" cy="9144000"/>
@@ -104,6 +105,11 @@
       </a:defRPr>
     </a:lvl9pPr>
   </p:defaultTextStyle>
+  <p:extLst>
+    <p:ext uri="{EFAFB233-063F-42B5-8137-9DF3F51BA10A}">
+      <p15:sldGuideLst xmlns:p15="http://schemas.microsoft.com/office/powerpoint/2012/main"/>
+    </p:ext>
+  </p:extLst>
 </p:presentation>
 </file>
 
@@ -238,7 +244,7 @@
           <a:p>
             <a:fld id="{77AAC647-34B3-4F2A-8E3A-2AB46E605130}" type="datetimeFigureOut">
               <a:rPr lang="en-US" smtClean="0"/>
-              <a:t>8/21/2022</a:t>
+              <a:t>8/22/2022</a:t>
             </a:fld>
             <a:endParaRPr lang="en-US"/>
           </a:p>
@@ -408,7 +414,7 @@
           <a:p>
             <a:fld id="{77AAC647-34B3-4F2A-8E3A-2AB46E605130}" type="datetimeFigureOut">
               <a:rPr lang="en-US" smtClean="0"/>
-              <a:t>8/21/2022</a:t>
+              <a:t>8/22/2022</a:t>
             </a:fld>
             <a:endParaRPr lang="en-US"/>
           </a:p>
@@ -588,7 +594,7 @@
           <a:p>
             <a:fld id="{77AAC647-34B3-4F2A-8E3A-2AB46E605130}" type="datetimeFigureOut">
               <a:rPr lang="en-US" smtClean="0"/>
-              <a:t>8/21/2022</a:t>
+              <a:t>8/22/2022</a:t>
             </a:fld>
             <a:endParaRPr lang="en-US"/>
           </a:p>
@@ -758,7 +764,7 @@
           <a:p>
             <a:fld id="{77AAC647-34B3-4F2A-8E3A-2AB46E605130}" type="datetimeFigureOut">
               <a:rPr lang="en-US" smtClean="0"/>
-              <a:t>8/21/2022</a:t>
+              <a:t>8/22/2022</a:t>
             </a:fld>
             <a:endParaRPr lang="en-US"/>
           </a:p>
@@ -1004,7 +1010,7 @@
           <a:p>
             <a:fld id="{77AAC647-34B3-4F2A-8E3A-2AB46E605130}" type="datetimeFigureOut">
               <a:rPr lang="en-US" smtClean="0"/>
-              <a:t>8/21/2022</a:t>
+              <a:t>8/22/2022</a:t>
             </a:fld>
             <a:endParaRPr lang="en-US"/>
           </a:p>
@@ -1236,7 +1242,7 @@
           <a:p>
             <a:fld id="{77AAC647-34B3-4F2A-8E3A-2AB46E605130}" type="datetimeFigureOut">
               <a:rPr lang="en-US" smtClean="0"/>
-              <a:t>8/21/2022</a:t>
+              <a:t>8/22/2022</a:t>
             </a:fld>
             <a:endParaRPr lang="en-US"/>
           </a:p>
@@ -1603,7 +1609,7 @@
           <a:p>
             <a:fld id="{77AAC647-34B3-4F2A-8E3A-2AB46E605130}" type="datetimeFigureOut">
               <a:rPr lang="en-US" smtClean="0"/>
-              <a:t>8/21/2022</a:t>
+              <a:t>8/22/2022</a:t>
             </a:fld>
             <a:endParaRPr lang="en-US"/>
           </a:p>
@@ -1721,7 +1727,7 @@
           <a:p>
             <a:fld id="{77AAC647-34B3-4F2A-8E3A-2AB46E605130}" type="datetimeFigureOut">
               <a:rPr lang="en-US" smtClean="0"/>
-              <a:t>8/21/2022</a:t>
+              <a:t>8/22/2022</a:t>
             </a:fld>
             <a:endParaRPr lang="en-US"/>
           </a:p>
@@ -1816,7 +1822,7 @@
           <a:p>
             <a:fld id="{77AAC647-34B3-4F2A-8E3A-2AB46E605130}" type="datetimeFigureOut">
               <a:rPr lang="en-US" smtClean="0"/>
-              <a:t>8/21/2022</a:t>
+              <a:t>8/22/2022</a:t>
             </a:fld>
             <a:endParaRPr lang="en-US"/>
           </a:p>
@@ -2093,7 +2099,7 @@
           <a:p>
             <a:fld id="{77AAC647-34B3-4F2A-8E3A-2AB46E605130}" type="datetimeFigureOut">
               <a:rPr lang="en-US" smtClean="0"/>
-              <a:t>8/21/2022</a:t>
+              <a:t>8/22/2022</a:t>
             </a:fld>
             <a:endParaRPr lang="en-US"/>
           </a:p>
@@ -2350,7 +2356,7 @@
           <a:p>
             <a:fld id="{77AAC647-34B3-4F2A-8E3A-2AB46E605130}" type="datetimeFigureOut">
               <a:rPr lang="en-US" smtClean="0"/>
-              <a:t>8/21/2022</a:t>
+              <a:t>8/22/2022</a:t>
             </a:fld>
             <a:endParaRPr lang="en-US"/>
           </a:p>
@@ -2563,7 +2569,7 @@
           <a:p>
             <a:fld id="{77AAC647-34B3-4F2A-8E3A-2AB46E605130}" type="datetimeFigureOut">
               <a:rPr lang="en-US" smtClean="0"/>
-              <a:t>8/21/2022</a:t>
+              <a:t>8/22/2022</a:t>
             </a:fld>
             <a:endParaRPr lang="en-US"/>
           </a:p>
@@ -5323,10 +5329,1288 @@
           </a:fontRef>
         </p:style>
       </p:cxnSp>
+      <p:sp>
+        <p:nvSpPr>
+          <p:cNvPr id="2" name="TextBox 1">
+            <a:extLst>
+              <a:ext uri="{FF2B5EF4-FFF2-40B4-BE49-F238E27FC236}">
+                <a16:creationId xmlns:a16="http://schemas.microsoft.com/office/drawing/2014/main" id="{26EFDA97-5078-6907-8A65-96E2D75458A1}"/>
+              </a:ext>
+            </a:extLst>
+          </p:cNvPr>
+          <p:cNvSpPr txBox="1"/>
+          <p:nvPr/>
+        </p:nvSpPr>
+        <p:spPr>
+          <a:xfrm>
+            <a:off x="0" y="-26273"/>
+            <a:ext cx="4954555" cy="369332"/>
+          </a:xfrm>
+          <a:prstGeom prst="rect">
+            <a:avLst/>
+          </a:prstGeom>
+          <a:noFill/>
+        </p:spPr>
+        <p:txBody>
+          <a:bodyPr wrap="square" rtlCol="0">
+            <a:spAutoFit/>
+          </a:bodyPr>
+          <a:lstStyle/>
+          <a:p>
+            <a:r>
+              <a:rPr lang="en-US" u="sng" dirty="0"/>
+              <a:t>POSTERIOR</a:t>
+            </a:r>
+          </a:p>
+        </p:txBody>
+      </p:sp>
     </p:spTree>
     <p:extLst>
       <p:ext uri="{BB962C8B-B14F-4D97-AF65-F5344CB8AC3E}">
         <p14:creationId xmlns:p14="http://schemas.microsoft.com/office/powerpoint/2010/main" val="3212384672"/>
+      </p:ext>
+    </p:extLst>
+  </p:cSld>
+  <p:clrMapOvr>
+    <a:masterClrMapping/>
+  </p:clrMapOvr>
+</p:sld>
+</file>
+
+<file path=ppt/slides/slide2.xml><?xml version="1.0" encoding="utf-8"?>
+<p:sld xmlns:a="http://schemas.openxmlformats.org/drawingml/2006/main" xmlns:r="http://schemas.openxmlformats.org/officeDocument/2006/relationships" xmlns:p="http://schemas.openxmlformats.org/presentationml/2006/main">
+  <p:cSld>
+    <p:spTree>
+      <p:nvGrpSpPr>
+        <p:cNvPr id="1" name=""/>
+        <p:cNvGrpSpPr/>
+        <p:nvPr/>
+      </p:nvGrpSpPr>
+      <p:grpSpPr>
+        <a:xfrm>
+          <a:off x="0" y="0"/>
+          <a:ext cx="0" cy="0"/>
+          <a:chOff x="0" y="0"/>
+          <a:chExt cx="0" cy="0"/>
+        </a:xfrm>
+      </p:grpSpPr>
+      <p:pic>
+        <p:nvPicPr>
+          <p:cNvPr id="11" name="Picture 10">
+            <a:extLst>
+              <a:ext uri="{FF2B5EF4-FFF2-40B4-BE49-F238E27FC236}">
+                <a16:creationId xmlns:a16="http://schemas.microsoft.com/office/drawing/2014/main" id="{AC2638BA-510D-6A52-8337-A503991A1C83}"/>
+              </a:ext>
+            </a:extLst>
+          </p:cNvPr>
+          <p:cNvPicPr>
+            <a:picLocks noChangeAspect="1"/>
+          </p:cNvPicPr>
+          <p:nvPr/>
+        </p:nvPicPr>
+        <p:blipFill>
+          <a:blip r:embed="rId2"/>
+          <a:stretch>
+            <a:fillRect/>
+          </a:stretch>
+        </p:blipFill>
+        <p:spPr>
+          <a:xfrm>
+            <a:off x="2307495" y="100126"/>
+            <a:ext cx="4564490" cy="541550"/>
+          </a:xfrm>
+          <a:prstGeom prst="rect">
+            <a:avLst/>
+          </a:prstGeom>
+        </p:spPr>
+      </p:pic>
+      <p:sp>
+        <p:nvSpPr>
+          <p:cNvPr id="4" name="TextBox 3">
+            <a:extLst>
+              <a:ext uri="{FF2B5EF4-FFF2-40B4-BE49-F238E27FC236}">
+                <a16:creationId xmlns:a16="http://schemas.microsoft.com/office/drawing/2014/main" id="{00E0C55E-B4F0-8456-DB70-B4BB5E18BEA7}"/>
+              </a:ext>
+            </a:extLst>
+          </p:cNvPr>
+          <p:cNvSpPr txBox="1"/>
+          <p:nvPr/>
+        </p:nvSpPr>
+        <p:spPr>
+          <a:xfrm>
+            <a:off x="0" y="486950"/>
+            <a:ext cx="2136709" cy="646331"/>
+          </a:xfrm>
+          <a:prstGeom prst="rect">
+            <a:avLst/>
+          </a:prstGeom>
+          <a:noFill/>
+        </p:spPr>
+        <p:txBody>
+          <a:bodyPr wrap="square" rtlCol="0">
+            <a:spAutoFit/>
+          </a:bodyPr>
+          <a:lstStyle/>
+          <a:p>
+            <a:r>
+              <a:rPr lang="en-US" u="sng" dirty="0"/>
+              <a:t>LIST of ALL OBJECTS/Procedures</a:t>
+            </a:r>
+          </a:p>
+        </p:txBody>
+      </p:sp>
+      <p:cxnSp>
+        <p:nvCxnSpPr>
+          <p:cNvPr id="12" name="Straight Arrow Connector 11">
+            <a:extLst>
+              <a:ext uri="{FF2B5EF4-FFF2-40B4-BE49-F238E27FC236}">
+                <a16:creationId xmlns:a16="http://schemas.microsoft.com/office/drawing/2014/main" id="{0BFCCD6E-D374-71F2-027D-2D9C3E6DA6AB}"/>
+              </a:ext>
+            </a:extLst>
+          </p:cNvPr>
+          <p:cNvCxnSpPr>
+            <a:cxnSpLocks/>
+          </p:cNvCxnSpPr>
+          <p:nvPr/>
+        </p:nvCxnSpPr>
+        <p:spPr>
+          <a:xfrm flipH="1">
+            <a:off x="1949474" y="212099"/>
+            <a:ext cx="6116264" cy="274851"/>
+          </a:xfrm>
+          <a:prstGeom prst="straightConnector1">
+            <a:avLst/>
+          </a:prstGeom>
+          <a:ln>
+            <a:tailEnd type="triangle"/>
+          </a:ln>
+        </p:spPr>
+        <p:style>
+          <a:lnRef idx="1">
+            <a:schemeClr val="accent1"/>
+          </a:lnRef>
+          <a:fillRef idx="0">
+            <a:schemeClr val="accent1"/>
+          </a:fillRef>
+          <a:effectRef idx="0">
+            <a:schemeClr val="accent1"/>
+          </a:effectRef>
+          <a:fontRef idx="minor">
+            <a:schemeClr val="tx1"/>
+          </a:fontRef>
+        </p:style>
+      </p:cxnSp>
+      <p:sp>
+        <p:nvSpPr>
+          <p:cNvPr id="14" name="TextBox 13">
+            <a:extLst>
+              <a:ext uri="{FF2B5EF4-FFF2-40B4-BE49-F238E27FC236}">
+                <a16:creationId xmlns:a16="http://schemas.microsoft.com/office/drawing/2014/main" id="{605A7DDF-0CEA-4EB0-9F48-7EE325C49B8B}"/>
+              </a:ext>
+            </a:extLst>
+          </p:cNvPr>
+          <p:cNvSpPr txBox="1"/>
+          <p:nvPr/>
+        </p:nvSpPr>
+        <p:spPr>
+          <a:xfrm>
+            <a:off x="-52542" y="2131262"/>
+            <a:ext cx="2568235" cy="338554"/>
+          </a:xfrm>
+          <a:prstGeom prst="rect">
+            <a:avLst/>
+          </a:prstGeom>
+          <a:noFill/>
+        </p:spPr>
+        <p:txBody>
+          <a:bodyPr wrap="square" rtlCol="0">
+            <a:spAutoFit/>
+          </a:bodyPr>
+          <a:lstStyle/>
+          <a:p>
+            <a:pPr algn="ctr"/>
+            <a:r>
+              <a:rPr lang="en-US" sz="1600" u="sng" dirty="0" err="1"/>
+              <a:t>Op_note_anterior_function</a:t>
+            </a:r>
+            <a:endParaRPr lang="en-US" sz="1600" u="sng" dirty="0"/>
+          </a:p>
+        </p:txBody>
+      </p:sp>
+      <p:sp>
+        <p:nvSpPr>
+          <p:cNvPr id="20" name="TextBox 19">
+            <a:extLst>
+              <a:ext uri="{FF2B5EF4-FFF2-40B4-BE49-F238E27FC236}">
+                <a16:creationId xmlns:a16="http://schemas.microsoft.com/office/drawing/2014/main" id="{2FD2CA79-627F-83AC-E955-D7BA6452C9C9}"/>
+              </a:ext>
+            </a:extLst>
+          </p:cNvPr>
+          <p:cNvSpPr txBox="1"/>
+          <p:nvPr/>
+        </p:nvSpPr>
+        <p:spPr>
+          <a:xfrm>
+            <a:off x="7045767" y="118215"/>
+            <a:ext cx="1362265" cy="261610"/>
+          </a:xfrm>
+          <a:prstGeom prst="rect">
+            <a:avLst/>
+          </a:prstGeom>
+          <a:noFill/>
+        </p:spPr>
+        <p:txBody>
+          <a:bodyPr wrap="square" rtlCol="0">
+            <a:spAutoFit/>
+          </a:bodyPr>
+          <a:lstStyle/>
+          <a:p>
+            <a:r>
+              <a:rPr lang="en-US" sz="1100" dirty="0" err="1"/>
+              <a:t>All_objects_to_Add</a:t>
+            </a:r>
+            <a:endParaRPr lang="en-US" sz="1100" dirty="0"/>
+          </a:p>
+        </p:txBody>
+      </p:sp>
+      <p:sp>
+        <p:nvSpPr>
+          <p:cNvPr id="30" name="TextBox 29">
+            <a:extLst>
+              <a:ext uri="{FF2B5EF4-FFF2-40B4-BE49-F238E27FC236}">
+                <a16:creationId xmlns:a16="http://schemas.microsoft.com/office/drawing/2014/main" id="{4577DA05-90F7-627A-4231-DBA798EEEDA5}"/>
+              </a:ext>
+            </a:extLst>
+          </p:cNvPr>
+          <p:cNvSpPr txBox="1"/>
+          <p:nvPr/>
+        </p:nvSpPr>
+        <p:spPr>
+          <a:xfrm>
+            <a:off x="2610257" y="2143723"/>
+            <a:ext cx="4261728" cy="338554"/>
+          </a:xfrm>
+          <a:prstGeom prst="rect">
+            <a:avLst/>
+          </a:prstGeom>
+          <a:noFill/>
+        </p:spPr>
+        <p:txBody>
+          <a:bodyPr wrap="square">
+            <a:spAutoFit/>
+          </a:bodyPr>
+          <a:lstStyle/>
+          <a:p>
+            <a:pPr algn="ctr"/>
+            <a:r>
+              <a:rPr lang="en-US" sz="1600" dirty="0" err="1"/>
+              <a:t>all_anterior_procedures_paragraphs_function</a:t>
+            </a:r>
+            <a:endParaRPr lang="en-US" sz="1600" dirty="0"/>
+          </a:p>
+        </p:txBody>
+      </p:sp>
+      <p:sp>
+        <p:nvSpPr>
+          <p:cNvPr id="39" name="TextBox 38">
+            <a:extLst>
+              <a:ext uri="{FF2B5EF4-FFF2-40B4-BE49-F238E27FC236}">
+                <a16:creationId xmlns:a16="http://schemas.microsoft.com/office/drawing/2014/main" id="{F7C7A1AA-AE07-6C6A-2EEE-E7407A31D40F}"/>
+              </a:ext>
+            </a:extLst>
+          </p:cNvPr>
+          <p:cNvSpPr txBox="1"/>
+          <p:nvPr/>
+        </p:nvSpPr>
+        <p:spPr>
+          <a:xfrm>
+            <a:off x="-54218" y="2508130"/>
+            <a:ext cx="2649891" cy="577081"/>
+          </a:xfrm>
+          <a:prstGeom prst="rect">
+            <a:avLst/>
+          </a:prstGeom>
+          <a:noFill/>
+        </p:spPr>
+        <p:txBody>
+          <a:bodyPr wrap="square" rtlCol="0">
+            <a:spAutoFit/>
+          </a:bodyPr>
+          <a:lstStyle/>
+          <a:p>
+            <a:pPr marL="285750" indent="-285750">
+              <a:buFont typeface="Arial" panose="020B0604020202020204" pitchFamily="34" charset="0"/>
+              <a:buChar char="•"/>
+            </a:pPr>
+            <a:r>
+              <a:rPr lang="en-US" sz="1050" dirty="0"/>
+              <a:t>Create first paragraphs.</a:t>
+            </a:r>
+          </a:p>
+          <a:p>
+            <a:pPr marL="285750" indent="-285750">
+              <a:buFont typeface="Arial" panose="020B0604020202020204" pitchFamily="34" charset="0"/>
+              <a:buChar char="•"/>
+            </a:pPr>
+            <a:r>
+              <a:rPr lang="en-US" sz="1050" dirty="0"/>
+              <a:t>Pass </a:t>
+            </a:r>
+            <a:r>
+              <a:rPr lang="en-US" sz="1050" dirty="0" err="1"/>
+              <a:t>all_objects_to_add</a:t>
+            </a:r>
+            <a:r>
+              <a:rPr lang="en-US" sz="1050" dirty="0"/>
+              <a:t> to function.</a:t>
+            </a:r>
+          </a:p>
+          <a:p>
+            <a:pPr marL="285750" indent="-285750">
+              <a:buFont typeface="Arial" panose="020B0604020202020204" pitchFamily="34" charset="0"/>
+              <a:buChar char="•"/>
+            </a:pPr>
+            <a:r>
+              <a:rPr lang="en-US" sz="1050" dirty="0"/>
+              <a:t>Create closing paragraph</a:t>
+            </a:r>
+          </a:p>
+        </p:txBody>
+      </p:sp>
+      <p:sp>
+        <p:nvSpPr>
+          <p:cNvPr id="46" name="TextBox 45">
+            <a:extLst>
+              <a:ext uri="{FF2B5EF4-FFF2-40B4-BE49-F238E27FC236}">
+                <a16:creationId xmlns:a16="http://schemas.microsoft.com/office/drawing/2014/main" id="{454183B6-A53B-DEBF-665C-DED620BC2F09}"/>
+              </a:ext>
+            </a:extLst>
+          </p:cNvPr>
+          <p:cNvSpPr txBox="1"/>
+          <p:nvPr/>
+        </p:nvSpPr>
+        <p:spPr>
+          <a:xfrm>
+            <a:off x="2747901" y="2383437"/>
+            <a:ext cx="3033481" cy="1277273"/>
+          </a:xfrm>
+          <a:prstGeom prst="rect">
+            <a:avLst/>
+          </a:prstGeom>
+          <a:noFill/>
+        </p:spPr>
+        <p:txBody>
+          <a:bodyPr wrap="square" rtlCol="0">
+            <a:spAutoFit/>
+          </a:bodyPr>
+          <a:lstStyle/>
+          <a:p>
+            <a:pPr marL="285750" indent="-285750">
+              <a:buFontTx/>
+              <a:buChar char="-"/>
+            </a:pPr>
+            <a:r>
+              <a:rPr lang="en-US" sz="1100" dirty="0"/>
+              <a:t>Identifies procedures as distinct or to combine multiple rows into one paragraph</a:t>
+            </a:r>
+          </a:p>
+          <a:p>
+            <a:pPr marL="285750" indent="-285750">
+              <a:buFontTx/>
+              <a:buChar char="-"/>
+            </a:pPr>
+            <a:r>
+              <a:rPr lang="en-US" sz="1100" dirty="0"/>
+              <a:t>Groups the procedures and creates nested </a:t>
+            </a:r>
+            <a:r>
+              <a:rPr lang="en-US" sz="1100" dirty="0" err="1"/>
+              <a:t>df</a:t>
+            </a:r>
+            <a:r>
+              <a:rPr lang="en-US" sz="1100" dirty="0"/>
+              <a:t> with individual </a:t>
+            </a:r>
+            <a:r>
+              <a:rPr lang="en-US" sz="1100" dirty="0" err="1"/>
+              <a:t>df</a:t>
+            </a:r>
+            <a:r>
+              <a:rPr lang="en-US" sz="1100" dirty="0"/>
+              <a:t> for each grouped procedure. Individual </a:t>
+            </a:r>
+            <a:r>
+              <a:rPr lang="en-US" sz="1100" dirty="0" err="1"/>
+              <a:t>df’s</a:t>
+            </a:r>
+            <a:r>
+              <a:rPr lang="en-US" sz="1100" dirty="0"/>
+              <a:t> contain procedure by level</a:t>
+            </a:r>
+          </a:p>
+          <a:p>
+            <a:pPr marL="285750" indent="-285750">
+              <a:buFontTx/>
+              <a:buChar char="-"/>
+            </a:pPr>
+            <a:r>
+              <a:rPr lang="en-US" sz="1100" dirty="0"/>
+              <a:t>Establishes paragraph intro</a:t>
+            </a:r>
+          </a:p>
+        </p:txBody>
+      </p:sp>
+      <p:sp>
+        <p:nvSpPr>
+          <p:cNvPr id="67" name="TextBox 66">
+            <a:extLst>
+              <a:ext uri="{FF2B5EF4-FFF2-40B4-BE49-F238E27FC236}">
+                <a16:creationId xmlns:a16="http://schemas.microsoft.com/office/drawing/2014/main" id="{BAC1D280-1961-5692-484E-F50FACE11F39}"/>
+              </a:ext>
+            </a:extLst>
+          </p:cNvPr>
+          <p:cNvSpPr txBox="1"/>
+          <p:nvPr/>
+        </p:nvSpPr>
+        <p:spPr>
+          <a:xfrm>
+            <a:off x="7863778" y="2162039"/>
+            <a:ext cx="4030744" cy="307777"/>
+          </a:xfrm>
+          <a:prstGeom prst="rect">
+            <a:avLst/>
+          </a:prstGeom>
+          <a:noFill/>
+        </p:spPr>
+        <p:txBody>
+          <a:bodyPr wrap="square">
+            <a:spAutoFit/>
+          </a:bodyPr>
+          <a:lstStyle/>
+          <a:p>
+            <a:pPr algn="ctr"/>
+            <a:r>
+              <a:rPr lang="en-US" sz="1400" dirty="0" err="1"/>
+              <a:t>anterior_create_full_paragraph_statement_function</a:t>
+            </a:r>
+            <a:endParaRPr lang="en-US" sz="1400" dirty="0"/>
+          </a:p>
+        </p:txBody>
+      </p:sp>
+      <p:cxnSp>
+        <p:nvCxnSpPr>
+          <p:cNvPr id="85" name="Straight Arrow Connector 84">
+            <a:extLst>
+              <a:ext uri="{FF2B5EF4-FFF2-40B4-BE49-F238E27FC236}">
+                <a16:creationId xmlns:a16="http://schemas.microsoft.com/office/drawing/2014/main" id="{67C0106F-40EB-C994-3B6D-9357E39FED35}"/>
+              </a:ext>
+            </a:extLst>
+          </p:cNvPr>
+          <p:cNvCxnSpPr>
+            <a:cxnSpLocks/>
+            <a:stCxn id="30" idx="3"/>
+            <a:endCxn id="67" idx="1"/>
+          </p:cNvCxnSpPr>
+          <p:nvPr/>
+        </p:nvCxnSpPr>
+        <p:spPr>
+          <a:xfrm>
+            <a:off x="6871985" y="2313000"/>
+            <a:ext cx="991793" cy="2928"/>
+          </a:xfrm>
+          <a:prstGeom prst="straightConnector1">
+            <a:avLst/>
+          </a:prstGeom>
+          <a:ln>
+            <a:tailEnd type="triangle"/>
+          </a:ln>
+        </p:spPr>
+        <p:style>
+          <a:lnRef idx="1">
+            <a:schemeClr val="accent1"/>
+          </a:lnRef>
+          <a:fillRef idx="0">
+            <a:schemeClr val="accent1"/>
+          </a:fillRef>
+          <a:effectRef idx="0">
+            <a:schemeClr val="accent1"/>
+          </a:effectRef>
+          <a:fontRef idx="minor">
+            <a:schemeClr val="tx1"/>
+          </a:fontRef>
+        </p:style>
+      </p:cxnSp>
+      <p:sp>
+        <p:nvSpPr>
+          <p:cNvPr id="91" name="TextBox 90">
+            <a:extLst>
+              <a:ext uri="{FF2B5EF4-FFF2-40B4-BE49-F238E27FC236}">
+                <a16:creationId xmlns:a16="http://schemas.microsoft.com/office/drawing/2014/main" id="{83116F87-6D3D-57C0-9CA9-9A9D82E269B5}"/>
+              </a:ext>
+            </a:extLst>
+          </p:cNvPr>
+          <p:cNvSpPr txBox="1"/>
+          <p:nvPr/>
+        </p:nvSpPr>
+        <p:spPr>
+          <a:xfrm>
+            <a:off x="8367201" y="2419743"/>
+            <a:ext cx="2819020" cy="938719"/>
+          </a:xfrm>
+          <a:prstGeom prst="rect">
+            <a:avLst/>
+          </a:prstGeom>
+          <a:noFill/>
+        </p:spPr>
+        <p:txBody>
+          <a:bodyPr wrap="square" rtlCol="0">
+            <a:spAutoFit/>
+          </a:bodyPr>
+          <a:lstStyle/>
+          <a:p>
+            <a:pPr marL="285750" indent="-285750">
+              <a:buFontTx/>
+              <a:buChar char="-"/>
+            </a:pPr>
+            <a:r>
+              <a:rPr lang="en-US" sz="1100" dirty="0"/>
+              <a:t>Divides into Combine or Distinct Paragraphs to run different functions</a:t>
+            </a:r>
+          </a:p>
+          <a:p>
+            <a:pPr marL="285750" indent="-285750">
+              <a:buFontTx/>
+              <a:buChar char="-"/>
+            </a:pPr>
+            <a:r>
+              <a:rPr lang="en-US" sz="1100" u="sng" dirty="0"/>
+              <a:t>Pass Nested </a:t>
+            </a:r>
+            <a:r>
+              <a:rPr lang="en-US" sz="1100" u="sng" dirty="0" err="1"/>
+              <a:t>Df</a:t>
+            </a:r>
+            <a:r>
+              <a:rPr lang="en-US" sz="1100" u="sng" dirty="0"/>
+              <a:t> + procedure category  + combined or distinct to:</a:t>
+            </a:r>
+          </a:p>
+          <a:p>
+            <a:pPr marL="285750" indent="-285750">
+              <a:buFontTx/>
+              <a:buChar char="-"/>
+            </a:pPr>
+            <a:endParaRPr lang="en-US" sz="1100" dirty="0"/>
+          </a:p>
+        </p:txBody>
+      </p:sp>
+      <p:sp>
+        <p:nvSpPr>
+          <p:cNvPr id="97" name="TextBox 96">
+            <a:extLst>
+              <a:ext uri="{FF2B5EF4-FFF2-40B4-BE49-F238E27FC236}">
+                <a16:creationId xmlns:a16="http://schemas.microsoft.com/office/drawing/2014/main" id="{D7226953-F971-71E5-6D86-D4A8E8BCF13F}"/>
+              </a:ext>
+            </a:extLst>
+          </p:cNvPr>
+          <p:cNvSpPr txBox="1"/>
+          <p:nvPr/>
+        </p:nvSpPr>
+        <p:spPr>
+          <a:xfrm>
+            <a:off x="7009481" y="3862464"/>
+            <a:ext cx="1626587" cy="261610"/>
+          </a:xfrm>
+          <a:prstGeom prst="rect">
+            <a:avLst/>
+          </a:prstGeom>
+          <a:noFill/>
+        </p:spPr>
+        <p:txBody>
+          <a:bodyPr wrap="square" rtlCol="0">
+            <a:spAutoFit/>
+          </a:bodyPr>
+          <a:lstStyle/>
+          <a:p>
+            <a:r>
+              <a:rPr lang="en-US" sz="1100" dirty="0"/>
+              <a:t>“Combine” Procedures</a:t>
+            </a:r>
+          </a:p>
+        </p:txBody>
+      </p:sp>
+      <p:sp>
+        <p:nvSpPr>
+          <p:cNvPr id="98" name="TextBox 97">
+            <a:extLst>
+              <a:ext uri="{FF2B5EF4-FFF2-40B4-BE49-F238E27FC236}">
+                <a16:creationId xmlns:a16="http://schemas.microsoft.com/office/drawing/2014/main" id="{E42C724C-168E-8FC0-74A0-1CBECD25C5AA}"/>
+              </a:ext>
+            </a:extLst>
+          </p:cNvPr>
+          <p:cNvSpPr txBox="1"/>
+          <p:nvPr/>
+        </p:nvSpPr>
+        <p:spPr>
+          <a:xfrm>
+            <a:off x="11089499" y="3660710"/>
+            <a:ext cx="1610045" cy="430887"/>
+          </a:xfrm>
+          <a:prstGeom prst="rect">
+            <a:avLst/>
+          </a:prstGeom>
+          <a:noFill/>
+        </p:spPr>
+        <p:txBody>
+          <a:bodyPr wrap="square" rtlCol="0">
+            <a:spAutoFit/>
+          </a:bodyPr>
+          <a:lstStyle/>
+          <a:p>
+            <a:r>
+              <a:rPr lang="en-US" sz="1100" dirty="0"/>
+              <a:t>“Distinct” Procedures (e.g. PSO, interbody)</a:t>
+            </a:r>
+          </a:p>
+        </p:txBody>
+      </p:sp>
+      <p:sp>
+        <p:nvSpPr>
+          <p:cNvPr id="100" name="TextBox 99">
+            <a:extLst>
+              <a:ext uri="{FF2B5EF4-FFF2-40B4-BE49-F238E27FC236}">
+                <a16:creationId xmlns:a16="http://schemas.microsoft.com/office/drawing/2014/main" id="{91F3AC4E-CA9D-874E-7DEA-1725246172C8}"/>
+              </a:ext>
+            </a:extLst>
+          </p:cNvPr>
+          <p:cNvSpPr txBox="1"/>
+          <p:nvPr/>
+        </p:nvSpPr>
+        <p:spPr>
+          <a:xfrm>
+            <a:off x="6327237" y="4233118"/>
+            <a:ext cx="2919400" cy="261610"/>
+          </a:xfrm>
+          <a:prstGeom prst="rect">
+            <a:avLst/>
+          </a:prstGeom>
+          <a:noFill/>
+        </p:spPr>
+        <p:txBody>
+          <a:bodyPr wrap="square">
+            <a:spAutoFit/>
+          </a:bodyPr>
+          <a:lstStyle/>
+          <a:p>
+            <a:pPr algn="ctr"/>
+            <a:r>
+              <a:rPr lang="en-US" sz="1100" dirty="0" err="1"/>
+              <a:t>op_note_object_combine_paragraph_function</a:t>
+            </a:r>
+            <a:endParaRPr lang="en-US" sz="1100" dirty="0"/>
+          </a:p>
+        </p:txBody>
+      </p:sp>
+      <p:sp>
+        <p:nvSpPr>
+          <p:cNvPr id="101" name="TextBox 100">
+            <a:extLst>
+              <a:ext uri="{FF2B5EF4-FFF2-40B4-BE49-F238E27FC236}">
+                <a16:creationId xmlns:a16="http://schemas.microsoft.com/office/drawing/2014/main" id="{C8A7CF0A-761A-ECDF-63EB-05F68F49CE03}"/>
+              </a:ext>
+            </a:extLst>
+          </p:cNvPr>
+          <p:cNvSpPr txBox="1"/>
+          <p:nvPr/>
+        </p:nvSpPr>
+        <p:spPr>
+          <a:xfrm>
+            <a:off x="10047317" y="4233674"/>
+            <a:ext cx="3390582" cy="261610"/>
+          </a:xfrm>
+          <a:prstGeom prst="rect">
+            <a:avLst/>
+          </a:prstGeom>
+          <a:noFill/>
+        </p:spPr>
+        <p:txBody>
+          <a:bodyPr wrap="square">
+            <a:spAutoFit/>
+          </a:bodyPr>
+          <a:lstStyle/>
+          <a:p>
+            <a:pPr algn="ctr"/>
+            <a:r>
+              <a:rPr lang="en-US" sz="1100" u="sng" dirty="0" err="1"/>
+              <a:t>anterior_op_note_distinct_paragraph_function</a:t>
+            </a:r>
+            <a:endParaRPr lang="en-US" sz="1100" u="sng" dirty="0"/>
+          </a:p>
+        </p:txBody>
+      </p:sp>
+      <p:sp>
+        <p:nvSpPr>
+          <p:cNvPr id="113" name="TextBox 112">
+            <a:extLst>
+              <a:ext uri="{FF2B5EF4-FFF2-40B4-BE49-F238E27FC236}">
+                <a16:creationId xmlns:a16="http://schemas.microsoft.com/office/drawing/2014/main" id="{858DFDC3-EA05-A12D-CBBF-741992CCBD6C}"/>
+              </a:ext>
+            </a:extLst>
+          </p:cNvPr>
+          <p:cNvSpPr txBox="1"/>
+          <p:nvPr/>
+        </p:nvSpPr>
+        <p:spPr>
+          <a:xfrm>
+            <a:off x="6084159" y="5207278"/>
+            <a:ext cx="3963158" cy="430887"/>
+          </a:xfrm>
+          <a:prstGeom prst="rect">
+            <a:avLst/>
+          </a:prstGeom>
+          <a:noFill/>
+        </p:spPr>
+        <p:txBody>
+          <a:bodyPr wrap="square" rtlCol="0">
+            <a:spAutoFit/>
+          </a:bodyPr>
+          <a:lstStyle/>
+          <a:p>
+            <a:r>
+              <a:rPr lang="en-US" sz="1100" dirty="0"/>
+              <a:t>Create text that specifies a technique for the specific object and combines the levels and any other additional info (e.g. screw size) </a:t>
+            </a:r>
+          </a:p>
+        </p:txBody>
+      </p:sp>
+      <p:sp>
+        <p:nvSpPr>
+          <p:cNvPr id="114" name="TextBox 113">
+            <a:extLst>
+              <a:ext uri="{FF2B5EF4-FFF2-40B4-BE49-F238E27FC236}">
+                <a16:creationId xmlns:a16="http://schemas.microsoft.com/office/drawing/2014/main" id="{4CE244B6-A5F5-6FD6-1C18-186009E7C349}"/>
+              </a:ext>
+            </a:extLst>
+          </p:cNvPr>
+          <p:cNvSpPr txBox="1"/>
+          <p:nvPr/>
+        </p:nvSpPr>
+        <p:spPr>
+          <a:xfrm>
+            <a:off x="6636234" y="4607114"/>
+            <a:ext cx="2301406" cy="600164"/>
+          </a:xfrm>
+          <a:prstGeom prst="rect">
+            <a:avLst/>
+          </a:prstGeom>
+          <a:noFill/>
+        </p:spPr>
+        <p:txBody>
+          <a:bodyPr wrap="square" rtlCol="0">
+            <a:spAutoFit/>
+          </a:bodyPr>
+          <a:lstStyle/>
+          <a:p>
+            <a:r>
+              <a:rPr lang="en-US" sz="1100" dirty="0"/>
+              <a:t>Create nested </a:t>
+            </a:r>
+            <a:r>
+              <a:rPr lang="en-US" sz="1100" dirty="0" err="1"/>
+              <a:t>df</a:t>
+            </a:r>
+            <a:r>
+              <a:rPr lang="en-US" sz="1100" dirty="0"/>
+              <a:t> grouped only by objects. So this has of levels and side for each specific object and pass to:</a:t>
+            </a:r>
+          </a:p>
+        </p:txBody>
+      </p:sp>
+      <p:sp>
+        <p:nvSpPr>
+          <p:cNvPr id="122" name="TextBox 121">
+            <a:extLst>
+              <a:ext uri="{FF2B5EF4-FFF2-40B4-BE49-F238E27FC236}">
+                <a16:creationId xmlns:a16="http://schemas.microsoft.com/office/drawing/2014/main" id="{320C4854-3954-852A-2E12-5B7307EB6C6F}"/>
+              </a:ext>
+            </a:extLst>
+          </p:cNvPr>
+          <p:cNvSpPr txBox="1"/>
+          <p:nvPr/>
+        </p:nvSpPr>
+        <p:spPr>
+          <a:xfrm>
+            <a:off x="10430312" y="4495284"/>
+            <a:ext cx="2624591" cy="261610"/>
+          </a:xfrm>
+          <a:prstGeom prst="rect">
+            <a:avLst/>
+          </a:prstGeom>
+          <a:noFill/>
+        </p:spPr>
+        <p:txBody>
+          <a:bodyPr wrap="square" rtlCol="0">
+            <a:spAutoFit/>
+          </a:bodyPr>
+          <a:lstStyle/>
+          <a:p>
+            <a:r>
+              <a:rPr lang="en-US" sz="1100" dirty="0"/>
+              <a:t>Create Text paragraph for the object</a:t>
+            </a:r>
+          </a:p>
+        </p:txBody>
+      </p:sp>
+      <p:cxnSp>
+        <p:nvCxnSpPr>
+          <p:cNvPr id="124" name="Straight Arrow Connector 123">
+            <a:extLst>
+              <a:ext uri="{FF2B5EF4-FFF2-40B4-BE49-F238E27FC236}">
+                <a16:creationId xmlns:a16="http://schemas.microsoft.com/office/drawing/2014/main" id="{9BAF3B4B-EDE9-EF3C-D850-201BC67B661B}"/>
+              </a:ext>
+            </a:extLst>
+          </p:cNvPr>
+          <p:cNvCxnSpPr>
+            <a:cxnSpLocks/>
+            <a:stCxn id="101" idx="2"/>
+            <a:endCxn id="122" idx="0"/>
+          </p:cNvCxnSpPr>
+          <p:nvPr/>
+        </p:nvCxnSpPr>
+        <p:spPr>
+          <a:xfrm>
+            <a:off x="11742608" y="4495284"/>
+            <a:ext cx="0" cy="0"/>
+          </a:xfrm>
+          <a:prstGeom prst="straightConnector1">
+            <a:avLst/>
+          </a:prstGeom>
+          <a:ln>
+            <a:tailEnd type="triangle"/>
+          </a:ln>
+        </p:spPr>
+        <p:style>
+          <a:lnRef idx="1">
+            <a:schemeClr val="accent1"/>
+          </a:lnRef>
+          <a:fillRef idx="0">
+            <a:schemeClr val="accent1"/>
+          </a:fillRef>
+          <a:effectRef idx="0">
+            <a:schemeClr val="accent1"/>
+          </a:effectRef>
+          <a:fontRef idx="minor">
+            <a:schemeClr val="tx1"/>
+          </a:fontRef>
+        </p:style>
+      </p:cxnSp>
+      <p:sp>
+        <p:nvSpPr>
+          <p:cNvPr id="2" name="TextBox 1">
+            <a:extLst>
+              <a:ext uri="{FF2B5EF4-FFF2-40B4-BE49-F238E27FC236}">
+                <a16:creationId xmlns:a16="http://schemas.microsoft.com/office/drawing/2014/main" id="{26EFDA97-5078-6907-8A65-96E2D75458A1}"/>
+              </a:ext>
+            </a:extLst>
+          </p:cNvPr>
+          <p:cNvSpPr txBox="1"/>
+          <p:nvPr/>
+        </p:nvSpPr>
+        <p:spPr>
+          <a:xfrm>
+            <a:off x="0" y="-26273"/>
+            <a:ext cx="4954555" cy="369332"/>
+          </a:xfrm>
+          <a:prstGeom prst="rect">
+            <a:avLst/>
+          </a:prstGeom>
+          <a:noFill/>
+        </p:spPr>
+        <p:txBody>
+          <a:bodyPr wrap="square" rtlCol="0">
+            <a:spAutoFit/>
+          </a:bodyPr>
+          <a:lstStyle/>
+          <a:p>
+            <a:r>
+              <a:rPr lang="en-US" u="sng" dirty="0"/>
+              <a:t>ANTERIOR</a:t>
+            </a:r>
+          </a:p>
+        </p:txBody>
+      </p:sp>
+      <p:pic>
+        <p:nvPicPr>
+          <p:cNvPr id="25" name="Picture 24">
+            <a:extLst>
+              <a:ext uri="{FF2B5EF4-FFF2-40B4-BE49-F238E27FC236}">
+                <a16:creationId xmlns:a16="http://schemas.microsoft.com/office/drawing/2014/main" id="{0B26F6ED-AA2E-AC62-6823-274BA8DED327}"/>
+              </a:ext>
+            </a:extLst>
+          </p:cNvPr>
+          <p:cNvPicPr>
+            <a:picLocks noChangeAspect="1"/>
+          </p:cNvPicPr>
+          <p:nvPr/>
+        </p:nvPicPr>
+        <p:blipFill>
+          <a:blip r:embed="rId3"/>
+          <a:stretch>
+            <a:fillRect/>
+          </a:stretch>
+        </p:blipFill>
+        <p:spPr>
+          <a:xfrm>
+            <a:off x="1619062" y="3877125"/>
+            <a:ext cx="4309574" cy="567900"/>
+          </a:xfrm>
+          <a:prstGeom prst="rect">
+            <a:avLst/>
+          </a:prstGeom>
+        </p:spPr>
+      </p:pic>
+      <p:sp>
+        <p:nvSpPr>
+          <p:cNvPr id="29" name="TextBox 28">
+            <a:extLst>
+              <a:ext uri="{FF2B5EF4-FFF2-40B4-BE49-F238E27FC236}">
+                <a16:creationId xmlns:a16="http://schemas.microsoft.com/office/drawing/2014/main" id="{6E1E4609-25EA-7686-E1B4-5419D347F871}"/>
+              </a:ext>
+            </a:extLst>
+          </p:cNvPr>
+          <p:cNvSpPr txBox="1"/>
+          <p:nvPr/>
+        </p:nvSpPr>
+        <p:spPr>
+          <a:xfrm>
+            <a:off x="1115012" y="1423272"/>
+            <a:ext cx="1362265" cy="261610"/>
+          </a:xfrm>
+          <a:prstGeom prst="rect">
+            <a:avLst/>
+          </a:prstGeom>
+          <a:noFill/>
+        </p:spPr>
+        <p:txBody>
+          <a:bodyPr wrap="square" rtlCol="0">
+            <a:spAutoFit/>
+          </a:bodyPr>
+          <a:lstStyle/>
+          <a:p>
+            <a:r>
+              <a:rPr lang="en-US" sz="1100" dirty="0"/>
+              <a:t>Creates:</a:t>
+            </a:r>
+          </a:p>
+        </p:txBody>
+      </p:sp>
+      <p:cxnSp>
+        <p:nvCxnSpPr>
+          <p:cNvPr id="37" name="Straight Arrow Connector 36">
+            <a:extLst>
+              <a:ext uri="{FF2B5EF4-FFF2-40B4-BE49-F238E27FC236}">
+                <a16:creationId xmlns:a16="http://schemas.microsoft.com/office/drawing/2014/main" id="{D4343ADC-3A67-D97F-EE02-CDDE7CABEB8A}"/>
+              </a:ext>
+            </a:extLst>
+          </p:cNvPr>
+          <p:cNvCxnSpPr>
+            <a:cxnSpLocks/>
+            <a:stCxn id="46" idx="2"/>
+            <a:endCxn id="25" idx="0"/>
+          </p:cNvCxnSpPr>
+          <p:nvPr/>
+        </p:nvCxnSpPr>
+        <p:spPr>
+          <a:xfrm flipH="1">
+            <a:off x="3773849" y="3660710"/>
+            <a:ext cx="490793" cy="216415"/>
+          </a:xfrm>
+          <a:prstGeom prst="straightConnector1">
+            <a:avLst/>
+          </a:prstGeom>
+          <a:ln>
+            <a:tailEnd type="triangle"/>
+          </a:ln>
+        </p:spPr>
+        <p:style>
+          <a:lnRef idx="1">
+            <a:schemeClr val="accent1"/>
+          </a:lnRef>
+          <a:fillRef idx="0">
+            <a:schemeClr val="accent1"/>
+          </a:fillRef>
+          <a:effectRef idx="0">
+            <a:schemeClr val="accent1"/>
+          </a:effectRef>
+          <a:fontRef idx="minor">
+            <a:schemeClr val="tx1"/>
+          </a:fontRef>
+        </p:style>
+      </p:cxnSp>
+      <p:pic>
+        <p:nvPicPr>
+          <p:cNvPr id="42" name="Picture 41">
+            <a:extLst>
+              <a:ext uri="{FF2B5EF4-FFF2-40B4-BE49-F238E27FC236}">
+                <a16:creationId xmlns:a16="http://schemas.microsoft.com/office/drawing/2014/main" id="{18D53C15-FB6C-1908-F7B6-9753225A8749}"/>
+              </a:ext>
+            </a:extLst>
+          </p:cNvPr>
+          <p:cNvPicPr>
+            <a:picLocks noChangeAspect="1"/>
+          </p:cNvPicPr>
+          <p:nvPr/>
+        </p:nvPicPr>
+        <p:blipFill>
+          <a:blip r:embed="rId4"/>
+          <a:stretch>
+            <a:fillRect/>
+          </a:stretch>
+        </p:blipFill>
+        <p:spPr>
+          <a:xfrm>
+            <a:off x="121844" y="4619762"/>
+            <a:ext cx="4618653" cy="331903"/>
+          </a:xfrm>
+          <a:prstGeom prst="rect">
+            <a:avLst/>
+          </a:prstGeom>
+        </p:spPr>
+      </p:pic>
+      <p:cxnSp>
+        <p:nvCxnSpPr>
+          <p:cNvPr id="44" name="Straight Arrow Connector 43">
+            <a:extLst>
+              <a:ext uri="{FF2B5EF4-FFF2-40B4-BE49-F238E27FC236}">
+                <a16:creationId xmlns:a16="http://schemas.microsoft.com/office/drawing/2014/main" id="{4B658ADC-047E-5232-2C22-7D7450F77A34}"/>
+              </a:ext>
+            </a:extLst>
+          </p:cNvPr>
+          <p:cNvCxnSpPr>
+            <a:cxnSpLocks/>
+            <a:endCxn id="42" idx="0"/>
+          </p:cNvCxnSpPr>
+          <p:nvPr/>
+        </p:nvCxnSpPr>
+        <p:spPr>
+          <a:xfrm flipH="1">
+            <a:off x="2431171" y="4196017"/>
+            <a:ext cx="1711621" cy="423745"/>
+          </a:xfrm>
+          <a:prstGeom prst="straightConnector1">
+            <a:avLst/>
+          </a:prstGeom>
+          <a:ln>
+            <a:tailEnd type="triangle"/>
+          </a:ln>
+        </p:spPr>
+        <p:style>
+          <a:lnRef idx="1">
+            <a:schemeClr val="accent1"/>
+          </a:lnRef>
+          <a:fillRef idx="0">
+            <a:schemeClr val="accent1"/>
+          </a:fillRef>
+          <a:effectRef idx="0">
+            <a:schemeClr val="accent1"/>
+          </a:effectRef>
+          <a:fontRef idx="minor">
+            <a:schemeClr val="tx1"/>
+          </a:fontRef>
+        </p:style>
+      </p:cxnSp>
+      <p:pic>
+        <p:nvPicPr>
+          <p:cNvPr id="48" name="Picture 47">
+            <a:extLst>
+              <a:ext uri="{FF2B5EF4-FFF2-40B4-BE49-F238E27FC236}">
+                <a16:creationId xmlns:a16="http://schemas.microsoft.com/office/drawing/2014/main" id="{9F6E268A-9E5D-D004-7B0D-4FB59E6CBCC6}"/>
+              </a:ext>
+            </a:extLst>
+          </p:cNvPr>
+          <p:cNvPicPr>
+            <a:picLocks noChangeAspect="1"/>
+          </p:cNvPicPr>
+          <p:nvPr/>
+        </p:nvPicPr>
+        <p:blipFill>
+          <a:blip r:embed="rId5"/>
+          <a:stretch>
+            <a:fillRect/>
+          </a:stretch>
+        </p:blipFill>
+        <p:spPr>
+          <a:xfrm>
+            <a:off x="1317114" y="5110493"/>
+            <a:ext cx="4130256" cy="416671"/>
+          </a:xfrm>
+          <a:prstGeom prst="rect">
+            <a:avLst/>
+          </a:prstGeom>
+        </p:spPr>
+      </p:pic>
+      <p:cxnSp>
+        <p:nvCxnSpPr>
+          <p:cNvPr id="50" name="Straight Arrow Connector 49">
+            <a:extLst>
+              <a:ext uri="{FF2B5EF4-FFF2-40B4-BE49-F238E27FC236}">
+                <a16:creationId xmlns:a16="http://schemas.microsoft.com/office/drawing/2014/main" id="{5CBDA431-C037-8C28-A3F1-1116FE1E260F}"/>
+              </a:ext>
+            </a:extLst>
+          </p:cNvPr>
+          <p:cNvCxnSpPr>
+            <a:cxnSpLocks/>
+            <a:stCxn id="91" idx="2"/>
+            <a:endCxn id="100" idx="0"/>
+          </p:cNvCxnSpPr>
+          <p:nvPr/>
+        </p:nvCxnSpPr>
+        <p:spPr>
+          <a:xfrm flipH="1">
+            <a:off x="7786937" y="3358462"/>
+            <a:ext cx="1989774" cy="874656"/>
+          </a:xfrm>
+          <a:prstGeom prst="straightConnector1">
+            <a:avLst/>
+          </a:prstGeom>
+          <a:ln>
+            <a:tailEnd type="triangle"/>
+          </a:ln>
+        </p:spPr>
+        <p:style>
+          <a:lnRef idx="1">
+            <a:schemeClr val="accent1"/>
+          </a:lnRef>
+          <a:fillRef idx="0">
+            <a:schemeClr val="accent1"/>
+          </a:fillRef>
+          <a:effectRef idx="0">
+            <a:schemeClr val="accent1"/>
+          </a:effectRef>
+          <a:fontRef idx="minor">
+            <a:schemeClr val="tx1"/>
+          </a:fontRef>
+        </p:style>
+      </p:cxnSp>
+      <p:cxnSp>
+        <p:nvCxnSpPr>
+          <p:cNvPr id="53" name="Straight Arrow Connector 52">
+            <a:extLst>
+              <a:ext uri="{FF2B5EF4-FFF2-40B4-BE49-F238E27FC236}">
+                <a16:creationId xmlns:a16="http://schemas.microsoft.com/office/drawing/2014/main" id="{4BD7AC81-D1E5-2702-8F0F-8596B0AAAED1}"/>
+              </a:ext>
+            </a:extLst>
+          </p:cNvPr>
+          <p:cNvCxnSpPr>
+            <a:cxnSpLocks/>
+            <a:stCxn id="91" idx="2"/>
+            <a:endCxn id="101" idx="0"/>
+          </p:cNvCxnSpPr>
+          <p:nvPr/>
+        </p:nvCxnSpPr>
+        <p:spPr>
+          <a:xfrm>
+            <a:off x="9776711" y="3358462"/>
+            <a:ext cx="1965897" cy="875212"/>
+          </a:xfrm>
+          <a:prstGeom prst="straightConnector1">
+            <a:avLst/>
+          </a:prstGeom>
+          <a:ln>
+            <a:tailEnd type="triangle"/>
+          </a:ln>
+        </p:spPr>
+        <p:style>
+          <a:lnRef idx="1">
+            <a:schemeClr val="accent1"/>
+          </a:lnRef>
+          <a:fillRef idx="0">
+            <a:schemeClr val="accent1"/>
+          </a:fillRef>
+          <a:effectRef idx="0">
+            <a:schemeClr val="accent1"/>
+          </a:effectRef>
+          <a:fontRef idx="minor">
+            <a:schemeClr val="tx1"/>
+          </a:fontRef>
+        </p:style>
+      </p:cxnSp>
+      <p:cxnSp>
+        <p:nvCxnSpPr>
+          <p:cNvPr id="77" name="Straight Arrow Connector 76">
+            <a:extLst>
+              <a:ext uri="{FF2B5EF4-FFF2-40B4-BE49-F238E27FC236}">
+                <a16:creationId xmlns:a16="http://schemas.microsoft.com/office/drawing/2014/main" id="{7C63D0DC-14F0-326D-C076-7DD7225E7FD6}"/>
+              </a:ext>
+            </a:extLst>
+          </p:cNvPr>
+          <p:cNvCxnSpPr>
+            <a:cxnSpLocks/>
+            <a:endCxn id="48" idx="0"/>
+          </p:cNvCxnSpPr>
+          <p:nvPr/>
+        </p:nvCxnSpPr>
+        <p:spPr>
+          <a:xfrm flipH="1">
+            <a:off x="3382242" y="4376057"/>
+            <a:ext cx="760550" cy="734436"/>
+          </a:xfrm>
+          <a:prstGeom prst="straightConnector1">
+            <a:avLst/>
+          </a:prstGeom>
+          <a:ln>
+            <a:tailEnd type="triangle"/>
+          </a:ln>
+        </p:spPr>
+        <p:style>
+          <a:lnRef idx="1">
+            <a:schemeClr val="accent1"/>
+          </a:lnRef>
+          <a:fillRef idx="0">
+            <a:schemeClr val="accent1"/>
+          </a:fillRef>
+          <a:effectRef idx="0">
+            <a:schemeClr val="accent1"/>
+          </a:effectRef>
+          <a:fontRef idx="minor">
+            <a:schemeClr val="tx1"/>
+          </a:fontRef>
+        </p:style>
+      </p:cxnSp>
+      <p:pic>
+        <p:nvPicPr>
+          <p:cNvPr id="86" name="Picture 85">
+            <a:extLst>
+              <a:ext uri="{FF2B5EF4-FFF2-40B4-BE49-F238E27FC236}">
+                <a16:creationId xmlns:a16="http://schemas.microsoft.com/office/drawing/2014/main" id="{B2396F02-6D20-FD21-23D4-5AD58C19EF25}"/>
+              </a:ext>
+            </a:extLst>
+          </p:cNvPr>
+          <p:cNvPicPr>
+            <a:picLocks noChangeAspect="1"/>
+          </p:cNvPicPr>
+          <p:nvPr/>
+        </p:nvPicPr>
+        <p:blipFill>
+          <a:blip r:embed="rId6"/>
+          <a:stretch>
+            <a:fillRect/>
+          </a:stretch>
+        </p:blipFill>
+        <p:spPr>
+          <a:xfrm>
+            <a:off x="5237017" y="1645667"/>
+            <a:ext cx="4261728" cy="501380"/>
+          </a:xfrm>
+          <a:prstGeom prst="rect">
+            <a:avLst/>
+          </a:prstGeom>
+        </p:spPr>
+      </p:pic>
+    </p:spTree>
+    <p:extLst>
+      <p:ext uri="{BB962C8B-B14F-4D97-AF65-F5344CB8AC3E}">
+        <p14:creationId xmlns:p14="http://schemas.microsoft.com/office/powerpoint/2010/main" val="113315116"/>
       </p:ext>
     </p:extLst>
   </p:cSld>

</xml_diff>